<commit_message>
Some changes and notes in presentation
</commit_message>
<xml_diff>
--- a/präsi-projekt-obj-geom.pptx
+++ b/präsi-projekt-obj-geom.pptx
@@ -9,8 +9,8 @@
   </p:notesMasterIdLst>
   <p:sldIdLst>
     <p:sldId id="256" r:id="rId2"/>
-    <p:sldId id="258" r:id="rId3"/>
-    <p:sldId id="266" r:id="rId4"/>
+    <p:sldId id="266" r:id="rId3"/>
+    <p:sldId id="258" r:id="rId4"/>
     <p:sldId id="257" r:id="rId5"/>
     <p:sldId id="263" r:id="rId6"/>
     <p:sldId id="261" r:id="rId7"/>
@@ -202,7 +202,7 @@
           <a:p>
             <a:fld id="{0A124C12-A3F9-436B-B427-937D56D33E8E}" type="datetimeFigureOut">
               <a:rPr lang="de-CH" smtClean="0"/>
-              <a:t>13.01.2016</a:t>
+              <a:t>15.01.2016</a:t>
             </a:fld>
             <a:endParaRPr lang="de-CH"/>
           </a:p>
@@ -515,10 +515,164 @@
           <a:lstStyle/>
           <a:p>
             <a:r>
-              <a:rPr lang="de-CH" dirty="0" err="1" smtClean="0"/>
-              <a:t>joel</a:t>
-            </a:r>
-            <a:endParaRPr lang="de-CH" dirty="0"/>
+              <a:rPr lang="de-CH" dirty="0" smtClean="0"/>
+              <a:t>Joel</a:t>
+            </a:r>
+          </a:p>
+          <a:p>
+            <a:endParaRPr lang="de-CH" sz="1200" kern="1200" dirty="0" smtClean="0">
+              <a:solidFill>
+                <a:schemeClr val="tx1"/>
+              </a:solidFill>
+              <a:effectLst/>
+              <a:latin typeface="+mn-lt"/>
+              <a:ea typeface="+mn-ea"/>
+              <a:cs typeface="+mn-cs"/>
+            </a:endParaRPr>
+          </a:p>
+          <a:p>
+            <a:r>
+              <a:rPr lang="de-CH" sz="1200" b="1" kern="1200" dirty="0" smtClean="0">
+                <a:solidFill>
+                  <a:schemeClr val="tx1"/>
+                </a:solidFill>
+                <a:effectLst/>
+                <a:latin typeface="+mn-lt"/>
+                <a:ea typeface="+mn-ea"/>
+                <a:cs typeface="+mn-cs"/>
+              </a:rPr>
+              <a:t>Rendern:</a:t>
+            </a:r>
+          </a:p>
+          <a:p>
+            <a:r>
+              <a:rPr lang="de-CH" sz="1200" kern="1200" dirty="0" smtClean="0">
+                <a:solidFill>
+                  <a:schemeClr val="tx1"/>
+                </a:solidFill>
+                <a:effectLst/>
+                <a:latin typeface="+mn-lt"/>
+                <a:ea typeface="+mn-ea"/>
+                <a:cs typeface="+mn-cs"/>
+              </a:rPr>
+              <a:t>bezeichnet den </a:t>
+            </a:r>
+            <a:r>
+              <a:rPr lang="de-CH" sz="1200" kern="1200" dirty="0" err="1" smtClean="0">
+                <a:solidFill>
+                  <a:schemeClr val="tx1"/>
+                </a:solidFill>
+                <a:effectLst/>
+                <a:latin typeface="+mn-lt"/>
+                <a:ea typeface="+mn-ea"/>
+                <a:cs typeface="+mn-cs"/>
+              </a:rPr>
+              <a:t>Proßess</a:t>
+            </a:r>
+            <a:r>
+              <a:rPr lang="de-CH" sz="1200" kern="1200" dirty="0" smtClean="0">
+                <a:solidFill>
+                  <a:schemeClr val="tx1"/>
+                </a:solidFill>
+                <a:effectLst/>
+                <a:latin typeface="+mn-lt"/>
+                <a:ea typeface="+mn-ea"/>
+                <a:cs typeface="+mn-cs"/>
+              </a:rPr>
+              <a:t> bei dem der Rechner ein Bild des jeweiligen Objektes erzeugt.</a:t>
+            </a:r>
+          </a:p>
+          <a:p>
+            <a:r>
+              <a:rPr lang="de-CH" sz="1200" kern="1200" dirty="0" smtClean="0">
+                <a:solidFill>
+                  <a:schemeClr val="tx1"/>
+                </a:solidFill>
+                <a:effectLst/>
+                <a:latin typeface="+mn-lt"/>
+                <a:ea typeface="+mn-ea"/>
+                <a:cs typeface="+mn-cs"/>
+              </a:rPr>
+              <a:t>Diese Objekte, wie Eingangs schon erwähnt bestehen aus geometrischen Primitiven, welche durch</a:t>
+            </a:r>
+            <a:r>
+              <a:rPr lang="de-CH" sz="1200" kern="1200" baseline="0" dirty="0" smtClean="0">
+                <a:solidFill>
+                  <a:schemeClr val="tx1"/>
+                </a:solidFill>
+                <a:effectLst/>
+                <a:latin typeface="+mn-lt"/>
+                <a:ea typeface="+mn-ea"/>
+                <a:cs typeface="+mn-cs"/>
+              </a:rPr>
+              <a:t> </a:t>
+            </a:r>
+            <a:r>
+              <a:rPr lang="de-CH" sz="1200" kern="1200" dirty="0" smtClean="0">
+                <a:solidFill>
+                  <a:schemeClr val="tx1"/>
+                </a:solidFill>
+                <a:effectLst/>
+                <a:latin typeface="+mn-lt"/>
+                <a:ea typeface="+mn-ea"/>
+                <a:cs typeface="+mn-cs"/>
+              </a:rPr>
+              <a:t>Vertices spezifiziert werden</a:t>
+            </a:r>
+          </a:p>
+          <a:p>
+            <a:endParaRPr lang="de-CH" dirty="0" smtClean="0"/>
+          </a:p>
+          <a:p>
+            <a:r>
+              <a:rPr lang="de-CH" b="1" dirty="0" smtClean="0"/>
+              <a:t>Beleuchtung:</a:t>
+            </a:r>
+          </a:p>
+          <a:p>
+            <a:pPr marL="171450" indent="-171450">
+              <a:buFont typeface="Arial" panose="020B0604020202020204" pitchFamily="34" charset="0"/>
+              <a:buChar char="•"/>
+            </a:pPr>
+            <a:r>
+              <a:rPr lang="de-CH" b="1" dirty="0" smtClean="0"/>
+              <a:t>Statisches</a:t>
+            </a:r>
+            <a:r>
+              <a:rPr lang="de-CH" b="1" baseline="0" dirty="0" smtClean="0"/>
+              <a:t> Punktlicht: </a:t>
+            </a:r>
+            <a:r>
+              <a:rPr lang="de-CH" b="0" baseline="0" dirty="0" smtClean="0"/>
+              <a:t>Sonne</a:t>
+            </a:r>
+          </a:p>
+          <a:p>
+            <a:pPr marL="171450" indent="-171450">
+              <a:buFont typeface="Arial" panose="020B0604020202020204" pitchFamily="34" charset="0"/>
+              <a:buChar char="•"/>
+            </a:pPr>
+            <a:r>
+              <a:rPr lang="de-CH" b="1" baseline="0" dirty="0" err="1" smtClean="0"/>
+              <a:t>Phong</a:t>
+            </a:r>
+            <a:r>
+              <a:rPr lang="de-CH" b="1" baseline="0" dirty="0" smtClean="0"/>
+              <a:t> </a:t>
+            </a:r>
+            <a:r>
+              <a:rPr lang="de-CH" b="1" baseline="0" dirty="0" err="1" smtClean="0"/>
+              <a:t>Reflection</a:t>
+            </a:r>
+            <a:r>
+              <a:rPr lang="de-CH" b="1" baseline="0" dirty="0" smtClean="0"/>
+              <a:t> Model:  </a:t>
+            </a:r>
+            <a:r>
+              <a:rPr lang="de-CH" b="0" baseline="0" dirty="0" smtClean="0"/>
+              <a:t>detaillierte Erläuterung folgt später.</a:t>
+            </a:r>
+            <a:endParaRPr lang="de-CH" b="1" dirty="0"/>
           </a:p>
         </p:txBody>
       </p:sp>
@@ -548,7 +702,7 @@
     </p:spTree>
     <p:extLst>
       <p:ext uri="{BB962C8B-B14F-4D97-AF65-F5344CB8AC3E}">
-        <p14:creationId xmlns:p14="http://schemas.microsoft.com/office/powerpoint/2010/main" val="1451443135"/>
+        <p14:creationId xmlns:p14="http://schemas.microsoft.com/office/powerpoint/2010/main" val="3115305498"/>
       </p:ext>
     </p:extLst>
   </p:cSld>
@@ -724,7 +878,7 @@
     </p:spTree>
     <p:extLst>
       <p:ext uri="{BB962C8B-B14F-4D97-AF65-F5344CB8AC3E}">
-        <p14:creationId xmlns:p14="http://schemas.microsoft.com/office/powerpoint/2010/main" val="3115305498"/>
+        <p14:creationId xmlns:p14="http://schemas.microsoft.com/office/powerpoint/2010/main" val="1451443135"/>
       </p:ext>
     </p:extLst>
   </p:cSld>
@@ -778,10 +932,642 @@
           <a:bodyPr/>
           <a:lstStyle/>
           <a:p>
-            <a:r>
-              <a:rPr lang="de-CH" dirty="0" err="1" smtClean="0"/>
-              <a:t>joel</a:t>
-            </a:r>
+            <a:pPr marL="0" marR="0" lvl="0" indent="0" algn="l" defTabSz="914400" rtl="0" eaLnBrk="1" fontAlgn="auto" latinLnBrk="0" hangingPunct="1">
+              <a:lnSpc>
+                <a:spcPct val="100000"/>
+              </a:lnSpc>
+              <a:spcBef>
+                <a:spcPts val="0"/>
+              </a:spcBef>
+              <a:spcAft>
+                <a:spcPts val="0"/>
+              </a:spcAft>
+              <a:buClrTx/>
+              <a:buSzTx/>
+              <a:buFontTx/>
+              <a:buNone/>
+              <a:tabLst/>
+              <a:defRPr/>
+            </a:pPr>
+            <a:endParaRPr lang="de-CH" sz="1200" b="1" kern="1200" dirty="0" smtClean="0">
+              <a:solidFill>
+                <a:schemeClr val="tx1"/>
+              </a:solidFill>
+              <a:effectLst/>
+              <a:latin typeface="+mn-lt"/>
+              <a:ea typeface="+mn-ea"/>
+              <a:cs typeface="+mn-cs"/>
+            </a:endParaRPr>
+          </a:p>
+          <a:p>
+            <a:pPr marL="0" marR="0" lvl="0" indent="0" algn="l" defTabSz="914400" rtl="0" eaLnBrk="1" fontAlgn="auto" latinLnBrk="0" hangingPunct="1">
+              <a:lnSpc>
+                <a:spcPct val="100000"/>
+              </a:lnSpc>
+              <a:spcBef>
+                <a:spcPts val="0"/>
+              </a:spcBef>
+              <a:spcAft>
+                <a:spcPts val="0"/>
+              </a:spcAft>
+              <a:buClrTx/>
+              <a:buSzTx/>
+              <a:buFontTx/>
+              <a:buNone/>
+              <a:tabLst/>
+              <a:defRPr/>
+            </a:pPr>
+            <a:r>
+              <a:rPr lang="de-CH" sz="1200" b="1" kern="1200" dirty="0" smtClean="0">
+                <a:solidFill>
+                  <a:schemeClr val="tx1"/>
+                </a:solidFill>
+                <a:effectLst/>
+                <a:latin typeface="+mn-lt"/>
+                <a:ea typeface="+mn-ea"/>
+                <a:cs typeface="+mn-cs"/>
+              </a:rPr>
+              <a:t>Vertex Array </a:t>
+            </a:r>
+            <a:r>
+              <a:rPr lang="de-CH" sz="1200" b="1" kern="1200" dirty="0" err="1" smtClean="0">
+                <a:solidFill>
+                  <a:schemeClr val="tx1"/>
+                </a:solidFill>
+                <a:effectLst/>
+                <a:latin typeface="+mn-lt"/>
+                <a:ea typeface="+mn-ea"/>
+                <a:cs typeface="+mn-cs"/>
+              </a:rPr>
+              <a:t>Object</a:t>
+            </a:r>
+            <a:r>
+              <a:rPr lang="de-CH" sz="1200" b="1" kern="1200" dirty="0" smtClean="0">
+                <a:solidFill>
+                  <a:schemeClr val="tx1"/>
+                </a:solidFill>
+                <a:effectLst/>
+                <a:latin typeface="+mn-lt"/>
+                <a:ea typeface="+mn-ea"/>
+                <a:cs typeface="+mn-cs"/>
+              </a:rPr>
+              <a:t> (VAO) und Vertex </a:t>
+            </a:r>
+            <a:r>
+              <a:rPr lang="de-CH" sz="1200" b="1" kern="1200" dirty="0" err="1" smtClean="0">
+                <a:solidFill>
+                  <a:schemeClr val="tx1"/>
+                </a:solidFill>
+                <a:effectLst/>
+                <a:latin typeface="+mn-lt"/>
+                <a:ea typeface="+mn-ea"/>
+                <a:cs typeface="+mn-cs"/>
+              </a:rPr>
+              <a:t>Buffer</a:t>
+            </a:r>
+            <a:r>
+              <a:rPr lang="de-CH" sz="1200" b="1" kern="1200" dirty="0" smtClean="0">
+                <a:solidFill>
+                  <a:schemeClr val="tx1"/>
+                </a:solidFill>
+                <a:effectLst/>
+                <a:latin typeface="+mn-lt"/>
+                <a:ea typeface="+mn-ea"/>
+                <a:cs typeface="+mn-cs"/>
+              </a:rPr>
+              <a:t> </a:t>
+            </a:r>
+            <a:r>
+              <a:rPr lang="de-CH" sz="1200" b="1" kern="1200" dirty="0" err="1" smtClean="0">
+                <a:solidFill>
+                  <a:schemeClr val="tx1"/>
+                </a:solidFill>
+                <a:effectLst/>
+                <a:latin typeface="+mn-lt"/>
+                <a:ea typeface="+mn-ea"/>
+                <a:cs typeface="+mn-cs"/>
+              </a:rPr>
+              <a:t>Object</a:t>
+            </a:r>
+            <a:r>
+              <a:rPr lang="de-CH" sz="1200" b="1" kern="1200" dirty="0" smtClean="0">
+                <a:solidFill>
+                  <a:schemeClr val="tx1"/>
+                </a:solidFill>
+                <a:effectLst/>
+                <a:latin typeface="+mn-lt"/>
+                <a:ea typeface="+mn-ea"/>
+                <a:cs typeface="+mn-cs"/>
+              </a:rPr>
+              <a:t> (VBO):</a:t>
+            </a:r>
+            <a:br>
+              <a:rPr lang="de-CH" sz="1200" b="1" kern="1200" dirty="0" smtClean="0">
+                <a:solidFill>
+                  <a:schemeClr val="tx1"/>
+                </a:solidFill>
+                <a:effectLst/>
+                <a:latin typeface="+mn-lt"/>
+                <a:ea typeface="+mn-ea"/>
+                <a:cs typeface="+mn-cs"/>
+              </a:rPr>
+            </a:br>
+            <a:r>
+              <a:rPr lang="de-CH" sz="1200" kern="1200" dirty="0" smtClean="0">
+                <a:solidFill>
+                  <a:schemeClr val="tx1"/>
+                </a:solidFill>
+                <a:effectLst/>
+                <a:latin typeface="+mn-lt"/>
+                <a:ea typeface="+mn-ea"/>
+                <a:cs typeface="+mn-cs"/>
+              </a:rPr>
+              <a:t>Das VBO enthält die eigentlichen </a:t>
+            </a:r>
+            <a:r>
+              <a:rPr lang="de-CH" sz="1200" kern="1200" dirty="0" err="1" smtClean="0">
+                <a:solidFill>
+                  <a:schemeClr val="tx1"/>
+                </a:solidFill>
+                <a:effectLst/>
+                <a:latin typeface="+mn-lt"/>
+                <a:ea typeface="+mn-ea"/>
+                <a:cs typeface="+mn-cs"/>
+              </a:rPr>
+              <a:t>Vertexdaten</a:t>
+            </a:r>
+            <a:r>
+              <a:rPr lang="de-CH" sz="1200" kern="1200" dirty="0" smtClean="0">
+                <a:solidFill>
+                  <a:schemeClr val="tx1"/>
+                </a:solidFill>
+                <a:effectLst/>
+                <a:latin typeface="+mn-lt"/>
+                <a:ea typeface="+mn-ea"/>
+                <a:cs typeface="+mn-cs"/>
+              </a:rPr>
+              <a:t> beispielsweise die Positionen, die </a:t>
+            </a:r>
+            <a:r>
+              <a:rPr lang="de-CH" sz="1200" kern="1200" dirty="0" err="1" smtClean="0">
+                <a:solidFill>
+                  <a:schemeClr val="tx1"/>
+                </a:solidFill>
+                <a:effectLst/>
+                <a:latin typeface="+mn-lt"/>
+                <a:ea typeface="+mn-ea"/>
+                <a:cs typeface="+mn-cs"/>
+              </a:rPr>
+              <a:t>Normalenvektoren</a:t>
+            </a:r>
+            <a:r>
+              <a:rPr lang="de-CH" sz="1200" kern="1200" dirty="0" smtClean="0">
+                <a:solidFill>
+                  <a:schemeClr val="tx1"/>
+                </a:solidFill>
+                <a:effectLst/>
+                <a:latin typeface="+mn-lt"/>
+                <a:ea typeface="+mn-ea"/>
+                <a:cs typeface="+mn-cs"/>
+              </a:rPr>
+              <a:t>, die Farben oder die Textur-</a:t>
+            </a:r>
+            <a:r>
+              <a:rPr lang="de-CH" sz="1200" kern="1200" dirty="0" err="1" smtClean="0">
+                <a:solidFill>
+                  <a:schemeClr val="tx1"/>
+                </a:solidFill>
+                <a:effectLst/>
+                <a:latin typeface="+mn-lt"/>
+                <a:ea typeface="+mn-ea"/>
+                <a:cs typeface="+mn-cs"/>
+              </a:rPr>
+              <a:t>Koordinatenen</a:t>
+            </a:r>
+            <a:r>
+              <a:rPr lang="de-CH" sz="1200" kern="1200" dirty="0" smtClean="0">
+                <a:solidFill>
+                  <a:schemeClr val="tx1"/>
+                </a:solidFill>
+                <a:effectLst/>
+                <a:latin typeface="+mn-lt"/>
+                <a:ea typeface="+mn-ea"/>
+                <a:cs typeface="+mn-cs"/>
+              </a:rPr>
+              <a:t>. Das VAO hingegen enthält die Informationen, in welchem VBO sich die benötigten Daten befinden und in welchem Format sie vorliegen, z.B. dass ein Vertex aus 3 </a:t>
+            </a:r>
+            <a:r>
+              <a:rPr lang="de-CH" sz="1200" kern="1200" dirty="0" err="1" smtClean="0">
+                <a:solidFill>
+                  <a:schemeClr val="tx1"/>
+                </a:solidFill>
+                <a:effectLst/>
+                <a:latin typeface="+mn-lt"/>
+                <a:ea typeface="+mn-ea"/>
+                <a:cs typeface="+mn-cs"/>
+              </a:rPr>
+              <a:t>floats</a:t>
+            </a:r>
+            <a:r>
+              <a:rPr lang="de-CH" sz="1200" kern="1200" dirty="0" smtClean="0">
+                <a:solidFill>
+                  <a:schemeClr val="tx1"/>
+                </a:solidFill>
+                <a:effectLst/>
+                <a:latin typeface="+mn-lt"/>
+                <a:ea typeface="+mn-ea"/>
+                <a:cs typeface="+mn-cs"/>
+              </a:rPr>
+              <a:t> für die Position, 3 </a:t>
+            </a:r>
+            <a:r>
+              <a:rPr lang="de-CH" sz="1200" kern="1200" dirty="0" err="1" smtClean="0">
+                <a:solidFill>
+                  <a:schemeClr val="tx1"/>
+                </a:solidFill>
+                <a:effectLst/>
+                <a:latin typeface="+mn-lt"/>
+                <a:ea typeface="+mn-ea"/>
+                <a:cs typeface="+mn-cs"/>
+              </a:rPr>
+              <a:t>bytes</a:t>
+            </a:r>
+            <a:r>
+              <a:rPr lang="de-CH" sz="1200" kern="1200" dirty="0" smtClean="0">
+                <a:solidFill>
+                  <a:schemeClr val="tx1"/>
+                </a:solidFill>
+                <a:effectLst/>
+                <a:latin typeface="+mn-lt"/>
+                <a:ea typeface="+mn-ea"/>
+                <a:cs typeface="+mn-cs"/>
+              </a:rPr>
+              <a:t> für den </a:t>
+            </a:r>
+            <a:r>
+              <a:rPr lang="de-CH" sz="1200" kern="1200" dirty="0" err="1" smtClean="0">
+                <a:solidFill>
+                  <a:schemeClr val="tx1"/>
+                </a:solidFill>
+                <a:effectLst/>
+                <a:latin typeface="+mn-lt"/>
+                <a:ea typeface="+mn-ea"/>
+                <a:cs typeface="+mn-cs"/>
+              </a:rPr>
+              <a:t>Normalenvektor</a:t>
+            </a:r>
+            <a:r>
+              <a:rPr lang="de-CH" sz="1200" kern="1200" dirty="0" smtClean="0">
+                <a:solidFill>
+                  <a:schemeClr val="tx1"/>
+                </a:solidFill>
+                <a:effectLst/>
+                <a:latin typeface="+mn-lt"/>
+                <a:ea typeface="+mn-ea"/>
+                <a:cs typeface="+mn-cs"/>
+              </a:rPr>
+              <a:t>.</a:t>
+            </a:r>
+            <a:br>
+              <a:rPr lang="de-CH" sz="1200" kern="1200" dirty="0" smtClean="0">
+                <a:solidFill>
+                  <a:schemeClr val="tx1"/>
+                </a:solidFill>
+                <a:effectLst/>
+                <a:latin typeface="+mn-lt"/>
+                <a:ea typeface="+mn-ea"/>
+                <a:cs typeface="+mn-cs"/>
+              </a:rPr>
+            </a:br>
+            <a:r>
+              <a:rPr lang="de-CH" sz="1200" kern="1200" dirty="0" smtClean="0">
+                <a:solidFill>
+                  <a:schemeClr val="tx1"/>
+                </a:solidFill>
+                <a:effectLst/>
+                <a:latin typeface="+mn-lt"/>
+                <a:ea typeface="+mn-ea"/>
+                <a:cs typeface="+mn-cs"/>
+              </a:rPr>
+              <a:t/>
+            </a:r>
+            <a:br>
+              <a:rPr lang="de-CH" sz="1200" kern="1200" dirty="0" smtClean="0">
+                <a:solidFill>
+                  <a:schemeClr val="tx1"/>
+                </a:solidFill>
+                <a:effectLst/>
+                <a:latin typeface="+mn-lt"/>
+                <a:ea typeface="+mn-ea"/>
+                <a:cs typeface="+mn-cs"/>
+              </a:rPr>
+            </a:br>
+            <a:r>
+              <a:rPr lang="de-CH" sz="1200" kern="1200" dirty="0" smtClean="0">
+                <a:solidFill>
+                  <a:schemeClr val="tx1"/>
+                </a:solidFill>
+                <a:effectLst/>
+                <a:latin typeface="+mn-lt"/>
+                <a:ea typeface="+mn-ea"/>
+                <a:cs typeface="+mn-cs"/>
+              </a:rPr>
+              <a:t>Der Vorteil vom Einsatz von VAO und VBO ist, dass die </a:t>
+            </a:r>
+            <a:r>
+              <a:rPr lang="de-CH" sz="1200" kern="1200" dirty="0" err="1" smtClean="0">
+                <a:solidFill>
+                  <a:schemeClr val="tx1"/>
+                </a:solidFill>
+                <a:effectLst/>
+                <a:latin typeface="+mn-lt"/>
+                <a:ea typeface="+mn-ea"/>
+                <a:cs typeface="+mn-cs"/>
+              </a:rPr>
+              <a:t>Vertexdaten</a:t>
+            </a:r>
+            <a:r>
+              <a:rPr lang="de-CH" sz="1200" kern="1200" dirty="0" smtClean="0">
+                <a:solidFill>
+                  <a:schemeClr val="tx1"/>
+                </a:solidFill>
+                <a:effectLst/>
+                <a:latin typeface="+mn-lt"/>
+                <a:ea typeface="+mn-ea"/>
+                <a:cs typeface="+mn-cs"/>
+              </a:rPr>
+              <a:t> im VRAM der Grafikkarte gespeichert werden, statt wie ohne Einsatz von VAO und VBO im Hauptspeicher der CPU. Das Problem bei einer Speicherung der </a:t>
+            </a:r>
+            <a:r>
+              <a:rPr lang="de-CH" sz="1200" kern="1200" dirty="0" err="1" smtClean="0">
+                <a:solidFill>
+                  <a:schemeClr val="tx1"/>
+                </a:solidFill>
+                <a:effectLst/>
+                <a:latin typeface="+mn-lt"/>
+                <a:ea typeface="+mn-ea"/>
+                <a:cs typeface="+mn-cs"/>
+              </a:rPr>
+              <a:t>Vertexdaten</a:t>
+            </a:r>
+            <a:r>
+              <a:rPr lang="de-CH" sz="1200" kern="1200" dirty="0" smtClean="0">
+                <a:solidFill>
+                  <a:schemeClr val="tx1"/>
+                </a:solidFill>
+                <a:effectLst/>
+                <a:latin typeface="+mn-lt"/>
+                <a:ea typeface="+mn-ea"/>
+                <a:cs typeface="+mn-cs"/>
+              </a:rPr>
+              <a:t> im Hauptspeicher ist, dass die Grafikkarte deutlich langsamer auf den Hauptspeicher  also auf das eigene VRAM zugreifen kann. Dies wirkt sich negativ auf die Performance der Anwendung aus, weil ein Flaschenhals zwischen CPU und GPU existiert. Dieser Flaschenhals kann mit dem Einsatz mit VAO und VBO umgangen werden. </a:t>
+            </a:r>
+          </a:p>
+          <a:p>
+            <a:endParaRPr lang="de-CH" sz="1200" kern="1200" dirty="0" smtClean="0">
+              <a:solidFill>
+                <a:schemeClr val="tx1"/>
+              </a:solidFill>
+              <a:effectLst/>
+              <a:latin typeface="+mn-lt"/>
+              <a:ea typeface="+mn-ea"/>
+              <a:cs typeface="+mn-cs"/>
+            </a:endParaRPr>
+          </a:p>
+          <a:p>
+            <a:endParaRPr lang="de-CH" sz="1200" kern="1200" dirty="0" smtClean="0">
+              <a:solidFill>
+                <a:schemeClr val="tx1"/>
+              </a:solidFill>
+              <a:effectLst/>
+              <a:latin typeface="+mn-lt"/>
+              <a:ea typeface="+mn-ea"/>
+              <a:cs typeface="+mn-cs"/>
+            </a:endParaRPr>
+          </a:p>
+          <a:p>
+            <a:pPr marL="0" marR="0" lvl="0" indent="0" algn="l" defTabSz="914400" rtl="0" eaLnBrk="1" fontAlgn="auto" latinLnBrk="0" hangingPunct="1">
+              <a:lnSpc>
+                <a:spcPct val="100000"/>
+              </a:lnSpc>
+              <a:spcBef>
+                <a:spcPts val="0"/>
+              </a:spcBef>
+              <a:spcAft>
+                <a:spcPts val="0"/>
+              </a:spcAft>
+              <a:buClrTx/>
+              <a:buSzTx/>
+              <a:buFontTx/>
+              <a:buNone/>
+              <a:tabLst/>
+              <a:defRPr/>
+            </a:pPr>
+            <a:r>
+              <a:rPr lang="de-CH" sz="1200" b="1" kern="1200" dirty="0" err="1" smtClean="0">
+                <a:solidFill>
+                  <a:schemeClr val="tx1"/>
+                </a:solidFill>
+                <a:effectLst/>
+                <a:latin typeface="+mn-lt"/>
+                <a:ea typeface="+mn-ea"/>
+                <a:cs typeface="+mn-cs"/>
+              </a:rPr>
+              <a:t>Shader</a:t>
+            </a:r>
+            <a:r>
+              <a:rPr lang="de-CH" sz="1200" b="1" kern="1200" baseline="0" dirty="0" smtClean="0">
+                <a:solidFill>
+                  <a:schemeClr val="tx1"/>
+                </a:solidFill>
+                <a:effectLst/>
+                <a:latin typeface="+mn-lt"/>
+                <a:ea typeface="+mn-ea"/>
+                <a:cs typeface="+mn-cs"/>
+              </a:rPr>
+              <a:t> &amp; GLSL:</a:t>
+            </a:r>
+            <a:r>
+              <a:rPr lang="de-CH" sz="1200" b="1" kern="1200" dirty="0" smtClean="0">
+                <a:solidFill>
+                  <a:schemeClr val="tx1"/>
+                </a:solidFill>
+                <a:effectLst/>
+                <a:latin typeface="+mn-lt"/>
+                <a:ea typeface="+mn-ea"/>
+                <a:cs typeface="+mn-cs"/>
+              </a:rPr>
+              <a:t/>
+            </a:r>
+            <a:br>
+              <a:rPr lang="de-CH" sz="1200" b="1" kern="1200" dirty="0" smtClean="0">
+                <a:solidFill>
+                  <a:schemeClr val="tx1"/>
+                </a:solidFill>
+                <a:effectLst/>
+                <a:latin typeface="+mn-lt"/>
+                <a:ea typeface="+mn-ea"/>
+                <a:cs typeface="+mn-cs"/>
+              </a:rPr>
+            </a:br>
+            <a:r>
+              <a:rPr lang="de-CH" sz="1200" kern="1200" dirty="0" smtClean="0">
+                <a:solidFill>
+                  <a:schemeClr val="tx1"/>
+                </a:solidFill>
+                <a:effectLst/>
+                <a:latin typeface="+mn-lt"/>
+                <a:ea typeface="+mn-ea"/>
+                <a:cs typeface="+mn-cs"/>
+              </a:rPr>
+              <a:t>GLSL ist eine C-ähnliche Programmiersprache, mit welcher es möglich, selbst </a:t>
+            </a:r>
+            <a:r>
+              <a:rPr lang="de-CH" sz="1200" kern="1200" dirty="0" err="1" smtClean="0">
+                <a:solidFill>
+                  <a:schemeClr val="tx1"/>
+                </a:solidFill>
+                <a:effectLst/>
+                <a:latin typeface="+mn-lt"/>
+                <a:ea typeface="+mn-ea"/>
+                <a:cs typeface="+mn-cs"/>
+              </a:rPr>
+              <a:t>Shaders</a:t>
+            </a:r>
+            <a:r>
+              <a:rPr lang="de-CH" sz="1200" kern="1200" dirty="0" smtClean="0">
+                <a:solidFill>
+                  <a:schemeClr val="tx1"/>
+                </a:solidFill>
+                <a:effectLst/>
+                <a:latin typeface="+mn-lt"/>
+                <a:ea typeface="+mn-ea"/>
+                <a:cs typeface="+mn-cs"/>
+              </a:rPr>
+              <a:t> zu schreiben und auf der GPU auszuführen. In der zu realisierenden Anwendung werden 2 verschiedene </a:t>
+            </a:r>
+            <a:r>
+              <a:rPr lang="de-CH" sz="1200" kern="1200" dirty="0" err="1" smtClean="0">
+                <a:solidFill>
+                  <a:schemeClr val="tx1"/>
+                </a:solidFill>
+                <a:effectLst/>
+                <a:latin typeface="+mn-lt"/>
+                <a:ea typeface="+mn-ea"/>
+                <a:cs typeface="+mn-cs"/>
+              </a:rPr>
+              <a:t>Shaders</a:t>
+            </a:r>
+            <a:r>
+              <a:rPr lang="de-CH" sz="1200" kern="1200" dirty="0" smtClean="0">
+                <a:solidFill>
+                  <a:schemeClr val="tx1"/>
+                </a:solidFill>
+                <a:effectLst/>
+                <a:latin typeface="+mn-lt"/>
+                <a:ea typeface="+mn-ea"/>
+                <a:cs typeface="+mn-cs"/>
+              </a:rPr>
+              <a:t> benötigt, den Fragment </a:t>
+            </a:r>
+            <a:r>
+              <a:rPr lang="de-CH" sz="1200" kern="1200" dirty="0" err="1" smtClean="0">
+                <a:solidFill>
+                  <a:schemeClr val="tx1"/>
+                </a:solidFill>
+                <a:effectLst/>
+                <a:latin typeface="+mn-lt"/>
+                <a:ea typeface="+mn-ea"/>
+                <a:cs typeface="+mn-cs"/>
+              </a:rPr>
+              <a:t>Shader</a:t>
+            </a:r>
+            <a:r>
+              <a:rPr lang="de-CH" sz="1200" kern="1200" dirty="0" smtClean="0">
+                <a:solidFill>
+                  <a:schemeClr val="tx1"/>
+                </a:solidFill>
+                <a:effectLst/>
+                <a:latin typeface="+mn-lt"/>
+                <a:ea typeface="+mn-ea"/>
+                <a:cs typeface="+mn-cs"/>
+              </a:rPr>
+              <a:t> und den Vertex </a:t>
+            </a:r>
+            <a:r>
+              <a:rPr lang="de-CH" sz="1200" kern="1200" dirty="0" err="1" smtClean="0">
+                <a:solidFill>
+                  <a:schemeClr val="tx1"/>
+                </a:solidFill>
+                <a:effectLst/>
+                <a:latin typeface="+mn-lt"/>
+                <a:ea typeface="+mn-ea"/>
+                <a:cs typeface="+mn-cs"/>
+              </a:rPr>
+              <a:t>Shader</a:t>
+            </a:r>
+            <a:r>
+              <a:rPr lang="de-CH" sz="1200" kern="1200" dirty="0" smtClean="0">
+                <a:solidFill>
+                  <a:schemeClr val="tx1"/>
+                </a:solidFill>
+                <a:effectLst/>
+                <a:latin typeface="+mn-lt"/>
+                <a:ea typeface="+mn-ea"/>
+                <a:cs typeface="+mn-cs"/>
+              </a:rPr>
+              <a:t>. Der Vertex </a:t>
+            </a:r>
+            <a:r>
+              <a:rPr lang="de-CH" sz="1200" kern="1200" dirty="0" err="1" smtClean="0">
+                <a:solidFill>
+                  <a:schemeClr val="tx1"/>
+                </a:solidFill>
+                <a:effectLst/>
+                <a:latin typeface="+mn-lt"/>
+                <a:ea typeface="+mn-ea"/>
+                <a:cs typeface="+mn-cs"/>
+              </a:rPr>
+              <a:t>Shader</a:t>
+            </a:r>
+            <a:r>
+              <a:rPr lang="de-CH" sz="1200" kern="1200" dirty="0" smtClean="0">
+                <a:solidFill>
+                  <a:schemeClr val="tx1"/>
+                </a:solidFill>
+                <a:effectLst/>
+                <a:latin typeface="+mn-lt"/>
+                <a:ea typeface="+mn-ea"/>
+                <a:cs typeface="+mn-cs"/>
+              </a:rPr>
+              <a:t> wird pro Vertex (Knoten) aufgerufen und er dient dazu die Geometrie einer Szene zu manipulieren (View, Projektion, Transformation). Der Fragment </a:t>
+            </a:r>
+            <a:r>
+              <a:rPr lang="de-CH" sz="1200" kern="1200" dirty="0" err="1" smtClean="0">
+                <a:solidFill>
+                  <a:schemeClr val="tx1"/>
+                </a:solidFill>
+                <a:effectLst/>
+                <a:latin typeface="+mn-lt"/>
+                <a:ea typeface="+mn-ea"/>
+                <a:cs typeface="+mn-cs"/>
+              </a:rPr>
+              <a:t>Shader</a:t>
+            </a:r>
+            <a:r>
+              <a:rPr lang="de-CH" sz="1200" kern="1200" dirty="0" smtClean="0">
+                <a:solidFill>
+                  <a:schemeClr val="tx1"/>
+                </a:solidFill>
+                <a:effectLst/>
+                <a:latin typeface="+mn-lt"/>
+                <a:ea typeface="+mn-ea"/>
+                <a:cs typeface="+mn-cs"/>
+              </a:rPr>
+              <a:t> bestimmt den Farbwert pro Pixel.</a:t>
+            </a:r>
+          </a:p>
+          <a:p>
             <a:endParaRPr lang="de-CH" dirty="0"/>
           </a:p>
         </p:txBody>
@@ -872,7 +1658,82 @@
             </a:r>
             <a:r>
               <a:rPr lang="de-CH" baseline="0" dirty="0" smtClean="0"/>
-              <a:t> zeigen - </a:t>
+              <a:t> </a:t>
+            </a:r>
+            <a:r>
+              <a:rPr lang="de-CH" baseline="0" dirty="0" smtClean="0"/>
+              <a:t>zeigen</a:t>
+            </a:r>
+          </a:p>
+          <a:p>
+            <a:r>
+              <a:rPr lang="de-CH" baseline="0" dirty="0" smtClean="0"/>
+              <a:t>OBJ (oder .</a:t>
+            </a:r>
+            <a:r>
+              <a:rPr lang="de-CH" baseline="0" dirty="0" err="1" smtClean="0"/>
+              <a:t>obj</a:t>
+            </a:r>
+            <a:r>
+              <a:rPr lang="de-CH" baseline="0" dirty="0" smtClean="0"/>
+              <a:t>) ist ein offenes Dateiformat zum Speichern von dreidimensionalen geometrischen Formen. Das von </a:t>
+            </a:r>
+            <a:r>
+              <a:rPr lang="de-CH" baseline="0" dirty="0" err="1" smtClean="0"/>
+              <a:t>Wavefront</a:t>
+            </a:r>
+            <a:r>
+              <a:rPr lang="de-CH" baseline="0" dirty="0" smtClean="0"/>
+              <a:t> Technologies entwickelte Format wird von vielen 3D-Grafikprogrammen unterstützt und ist daher geeignet für die programm- und plattformübergreifende Weitergabe von 3D-Modellen.</a:t>
+            </a:r>
+          </a:p>
+          <a:p>
+            <a:endParaRPr lang="de-CH" baseline="0" dirty="0" smtClean="0"/>
+          </a:p>
+          <a:p>
+            <a:pPr marL="171450" indent="-171450">
+              <a:buFontTx/>
+              <a:buChar char="-"/>
+            </a:pPr>
+            <a:r>
+              <a:rPr lang="de-CH" baseline="0" dirty="0" smtClean="0"/>
+              <a:t>Generierung der </a:t>
+            </a:r>
+            <a:r>
+              <a:rPr lang="de-CH" baseline="0" dirty="0" err="1" smtClean="0"/>
+              <a:t>Obj</a:t>
+            </a:r>
+            <a:r>
+              <a:rPr lang="de-CH" baseline="0" dirty="0" smtClean="0"/>
+              <a:t>-Files mit Blender (Kostenlose </a:t>
+            </a:r>
+            <a:r>
+              <a:rPr lang="de-CH" baseline="0" dirty="0" err="1" smtClean="0"/>
+              <a:t>Opensource</a:t>
+            </a:r>
+            <a:r>
+              <a:rPr lang="de-CH" baseline="0" dirty="0" smtClean="0"/>
+              <a:t> Software zur Erstellung von 3D Grafiken und Software)</a:t>
+            </a:r>
+          </a:p>
+          <a:p>
+            <a:pPr marL="0" indent="0">
+              <a:buFontTx/>
+              <a:buNone/>
+            </a:pPr>
+            <a:endParaRPr lang="de-CH" baseline="0" dirty="0" smtClean="0"/>
+          </a:p>
+          <a:p>
+            <a:endParaRPr lang="de-CH" baseline="0" dirty="0" smtClean="0"/>
+          </a:p>
+          <a:p>
+            <a:r>
+              <a:rPr lang="de-CH" baseline="0" dirty="0" smtClean="0"/>
+              <a:t> </a:t>
+            </a:r>
+            <a:r>
+              <a:rPr lang="de-CH" baseline="0" dirty="0" smtClean="0"/>
+              <a:t>- </a:t>
             </a:r>
             <a:r>
               <a:rPr lang="de-CH" baseline="0" dirty="0" err="1" smtClean="0"/>
@@ -1546,7 +2407,7 @@
           <a:p>
             <a:fld id="{1BA50D42-C9CD-4801-B293-61D1F53EC57E}" type="datetimeFigureOut">
               <a:rPr lang="de-DE" smtClean="0"/>
-              <a:t>13.01.2016</a:t>
+              <a:t>15.01.2016</a:t>
             </a:fld>
             <a:endParaRPr lang="de-DE"/>
           </a:p>
@@ -1746,7 +2607,7 @@
           <a:p>
             <a:fld id="{1BA50D42-C9CD-4801-B293-61D1F53EC57E}" type="datetimeFigureOut">
               <a:rPr lang="de-DE" smtClean="0"/>
-              <a:t>13.01.2016</a:t>
+              <a:t>15.01.2016</a:t>
             </a:fld>
             <a:endParaRPr lang="de-DE"/>
           </a:p>
@@ -1921,7 +2782,7 @@
           <a:p>
             <a:fld id="{1BA50D42-C9CD-4801-B293-61D1F53EC57E}" type="datetimeFigureOut">
               <a:rPr lang="de-DE" smtClean="0"/>
-              <a:t>13.01.2016</a:t>
+              <a:t>15.01.2016</a:t>
             </a:fld>
             <a:endParaRPr lang="de-DE"/>
           </a:p>
@@ -2086,7 +2947,7 @@
           <a:p>
             <a:fld id="{1BA50D42-C9CD-4801-B293-61D1F53EC57E}" type="datetimeFigureOut">
               <a:rPr lang="de-DE" smtClean="0"/>
-              <a:t>13.01.2016</a:t>
+              <a:t>15.01.2016</a:t>
             </a:fld>
             <a:endParaRPr lang="de-DE"/>
           </a:p>
@@ -2334,7 +3195,7 @@
           <a:p>
             <a:fld id="{1BA50D42-C9CD-4801-B293-61D1F53EC57E}" type="datetimeFigureOut">
               <a:rPr lang="de-DE" smtClean="0"/>
-              <a:t>13.01.2016</a:t>
+              <a:t>15.01.2016</a:t>
             </a:fld>
             <a:endParaRPr lang="de-DE"/>
           </a:p>
@@ -2652,7 +3513,7 @@
           <a:p>
             <a:fld id="{1BA50D42-C9CD-4801-B293-61D1F53EC57E}" type="datetimeFigureOut">
               <a:rPr lang="de-DE" smtClean="0"/>
-              <a:t>13.01.2016</a:t>
+              <a:t>15.01.2016</a:t>
             </a:fld>
             <a:endParaRPr lang="de-DE"/>
           </a:p>
@@ -3118,7 +3979,7 @@
           <a:p>
             <a:fld id="{1BA50D42-C9CD-4801-B293-61D1F53EC57E}" type="datetimeFigureOut">
               <a:rPr lang="de-DE" smtClean="0"/>
-              <a:t>13.01.2016</a:t>
+              <a:t>15.01.2016</a:t>
             </a:fld>
             <a:endParaRPr lang="de-DE"/>
           </a:p>
@@ -3266,7 +4127,7 @@
           <a:p>
             <a:fld id="{1BA50D42-C9CD-4801-B293-61D1F53EC57E}" type="datetimeFigureOut">
               <a:rPr lang="de-DE" smtClean="0"/>
-              <a:t>13.01.2016</a:t>
+              <a:t>15.01.2016</a:t>
             </a:fld>
             <a:endParaRPr lang="de-DE"/>
           </a:p>
@@ -3356,7 +4217,7 @@
           <a:p>
             <a:fld id="{1BA50D42-C9CD-4801-B293-61D1F53EC57E}" type="datetimeFigureOut">
               <a:rPr lang="de-DE" smtClean="0"/>
-              <a:t>13.01.2016</a:t>
+              <a:t>15.01.2016</a:t>
             </a:fld>
             <a:endParaRPr lang="de-DE"/>
           </a:p>
@@ -3630,7 +4491,7 @@
           <a:p>
             <a:fld id="{1BA50D42-C9CD-4801-B293-61D1F53EC57E}" type="datetimeFigureOut">
               <a:rPr lang="de-DE" smtClean="0"/>
-              <a:t>13.01.2016</a:t>
+              <a:t>15.01.2016</a:t>
             </a:fld>
             <a:endParaRPr lang="de-DE"/>
           </a:p>
@@ -3935,7 +4796,7 @@
           <a:p>
             <a:fld id="{1BA50D42-C9CD-4801-B293-61D1F53EC57E}" type="datetimeFigureOut">
               <a:rPr lang="de-DE" smtClean="0"/>
-              <a:t>13.01.2016</a:t>
+              <a:t>15.01.2016</a:t>
             </a:fld>
             <a:endParaRPr lang="de-DE"/>
           </a:p>
@@ -4233,7 +5094,7 @@
           <a:p>
             <a:fld id="{1BA50D42-C9CD-4801-B293-61D1F53EC57E}" type="datetimeFigureOut">
               <a:rPr lang="de-DE" smtClean="0"/>
-              <a:t>13.01.2016</a:t>
+              <a:t>15.01.2016</a:t>
             </a:fld>
             <a:endParaRPr lang="de-DE"/>
           </a:p>
@@ -5661,6 +6522,259 @@
           <a:p>
             <a:r>
               <a:rPr lang="de-CH" dirty="0" smtClean="0"/>
+              <a:t>Projekt OpenGL </a:t>
+            </a:r>
+            <a:r>
+              <a:rPr lang="de-CH" dirty="0" err="1" smtClean="0"/>
+              <a:t>Wavefront</a:t>
+            </a:r>
+            <a:r>
+              <a:rPr lang="de-CH" dirty="0" smtClean="0"/>
+              <a:t> Viewer</a:t>
+            </a:r>
+            <a:endParaRPr lang="de-CH" dirty="0"/>
+          </a:p>
+        </p:txBody>
+      </p:sp>
+      <p:sp>
+        <p:nvSpPr>
+          <p:cNvPr id="3" name="Inhaltsplatzhalter 2"/>
+          <p:cNvSpPr>
+            <a:spLocks noGrp="1"/>
+          </p:cNvSpPr>
+          <p:nvPr>
+            <p:ph idx="1"/>
+          </p:nvPr>
+        </p:nvSpPr>
+        <p:spPr/>
+        <p:txBody>
+          <a:bodyPr>
+            <a:noAutofit/>
+          </a:bodyPr>
+          <a:lstStyle/>
+          <a:p>
+            <a:pPr marL="0" indent="0">
+              <a:buNone/>
+            </a:pPr>
+            <a:r>
+              <a:rPr lang="de-CH" sz="1600" dirty="0" err="1"/>
+              <a:t>Wavefront</a:t>
+            </a:r>
+            <a:r>
+              <a:rPr lang="de-CH" sz="1600" dirty="0"/>
+              <a:t> </a:t>
+            </a:r>
+            <a:r>
+              <a:rPr lang="de-CH" sz="1600" dirty="0" err="1" smtClean="0"/>
+              <a:t>Obj</a:t>
+            </a:r>
+            <a:r>
+              <a:rPr lang="de-CH" sz="1600" dirty="0" smtClean="0"/>
+              <a:t>: </a:t>
+            </a:r>
+            <a:endParaRPr lang="de-CH" sz="1600" dirty="0" smtClean="0"/>
+          </a:p>
+          <a:p>
+            <a:pPr lvl="1"/>
+            <a:r>
+              <a:rPr lang="de-CH" sz="1600" dirty="0" smtClean="0"/>
+              <a:t>Datei einlesen</a:t>
+            </a:r>
+          </a:p>
+          <a:p>
+            <a:pPr marL="0" indent="0">
+              <a:buNone/>
+            </a:pPr>
+            <a:endParaRPr lang="de-CH" sz="1600" dirty="0" smtClean="0"/>
+          </a:p>
+          <a:p>
+            <a:pPr marL="0" indent="0">
+              <a:buNone/>
+            </a:pPr>
+            <a:r>
+              <a:rPr lang="de-CH" sz="1600" dirty="0" smtClean="0"/>
+              <a:t>Rendering:</a:t>
+            </a:r>
+            <a:endParaRPr lang="de-CH" sz="1600" dirty="0" smtClean="0"/>
+          </a:p>
+          <a:p>
+            <a:pPr lvl="1"/>
+            <a:r>
+              <a:rPr lang="de-CH" sz="1600" dirty="0" smtClean="0"/>
+              <a:t>3D Model gemäss </a:t>
+            </a:r>
+            <a:r>
+              <a:rPr lang="de-CH" sz="1600" dirty="0" err="1" smtClean="0"/>
+              <a:t>Obj</a:t>
+            </a:r>
+            <a:endParaRPr lang="de-CH" sz="1600" dirty="0" smtClean="0"/>
+          </a:p>
+          <a:p>
+            <a:pPr lvl="1"/>
+            <a:r>
+              <a:rPr lang="de-CH" sz="1600" dirty="0" smtClean="0"/>
+              <a:t>Gitternetz</a:t>
+            </a:r>
+          </a:p>
+          <a:p>
+            <a:pPr lvl="1"/>
+            <a:r>
+              <a:rPr lang="de-CH" sz="1600" dirty="0" smtClean="0"/>
+              <a:t>Sonne</a:t>
+            </a:r>
+          </a:p>
+          <a:p>
+            <a:pPr lvl="1"/>
+            <a:endParaRPr lang="de-CH" sz="1600" dirty="0" smtClean="0"/>
+          </a:p>
+          <a:p>
+            <a:pPr marL="0" indent="0">
+              <a:buNone/>
+            </a:pPr>
+            <a:r>
+              <a:rPr lang="de-CH" sz="1600" dirty="0" smtClean="0"/>
+              <a:t>Beleuchtung:</a:t>
+            </a:r>
+            <a:endParaRPr lang="de-CH" sz="1600" dirty="0"/>
+          </a:p>
+          <a:p>
+            <a:pPr lvl="1"/>
+            <a:r>
+              <a:rPr lang="de-CH" sz="1600" dirty="0" smtClean="0"/>
+              <a:t>Statisches Punktlicht </a:t>
+            </a:r>
+          </a:p>
+          <a:p>
+            <a:pPr lvl="1"/>
+            <a:r>
+              <a:rPr lang="de-CH" sz="1600" dirty="0" err="1"/>
+              <a:t>Phong</a:t>
+            </a:r>
+            <a:r>
+              <a:rPr lang="de-CH" sz="1600" dirty="0"/>
+              <a:t> </a:t>
+            </a:r>
+            <a:r>
+              <a:rPr lang="de-CH" sz="1600" dirty="0" err="1"/>
+              <a:t>reflection</a:t>
+            </a:r>
+            <a:r>
+              <a:rPr lang="de-CH" sz="1600" dirty="0"/>
+              <a:t> </a:t>
+            </a:r>
+            <a:r>
+              <a:rPr lang="de-CH" sz="1600" dirty="0" err="1" smtClean="0"/>
+              <a:t>model</a:t>
+            </a:r>
+            <a:endParaRPr lang="de-CH" sz="1600" dirty="0" smtClean="0"/>
+          </a:p>
+          <a:p>
+            <a:pPr lvl="1"/>
+            <a:r>
+              <a:rPr lang="de-CH" sz="1600" dirty="0" smtClean="0"/>
+              <a:t>Ambientes, Diffuses, </a:t>
+            </a:r>
+            <a:r>
+              <a:rPr lang="de-CH" sz="1600" dirty="0" err="1" smtClean="0"/>
+              <a:t>Spekulares</a:t>
+            </a:r>
+            <a:r>
+              <a:rPr lang="de-CH" sz="1600" dirty="0" smtClean="0"/>
+              <a:t> Licht</a:t>
+            </a:r>
+          </a:p>
+          <a:p>
+            <a:pPr marL="0" indent="0">
+              <a:buNone/>
+            </a:pPr>
+            <a:endParaRPr lang="de-CH" sz="1600" dirty="0" smtClean="0"/>
+          </a:p>
+          <a:p>
+            <a:pPr marL="0" indent="0">
+              <a:buNone/>
+            </a:pPr>
+            <a:r>
+              <a:rPr lang="de-CH" sz="1600" dirty="0" smtClean="0"/>
+              <a:t>Matrizen:</a:t>
+            </a:r>
+            <a:endParaRPr lang="de-CH" sz="1600" dirty="0"/>
+          </a:p>
+          <a:p>
+            <a:pPr lvl="1"/>
+            <a:r>
+              <a:rPr lang="de-CH" sz="1600" dirty="0" smtClean="0"/>
+              <a:t>Projektionsmatrix</a:t>
+            </a:r>
+            <a:endParaRPr lang="de-CH" sz="1600" dirty="0"/>
+          </a:p>
+          <a:p>
+            <a:pPr lvl="1"/>
+            <a:r>
+              <a:rPr lang="de-CH" sz="1600" dirty="0" smtClean="0"/>
+              <a:t>Transformationsmatrix</a:t>
+            </a:r>
+            <a:endParaRPr lang="de-CH" sz="1600" dirty="0"/>
+          </a:p>
+          <a:p>
+            <a:pPr lvl="1"/>
+            <a:endParaRPr lang="de-CH" sz="1600" dirty="0"/>
+          </a:p>
+        </p:txBody>
+      </p:sp>
+    </p:spTree>
+    <p:extLst>
+      <p:ext uri="{BB962C8B-B14F-4D97-AF65-F5344CB8AC3E}">
+        <p14:creationId xmlns:p14="http://schemas.microsoft.com/office/powerpoint/2010/main" val="2870412615"/>
+      </p:ext>
+    </p:extLst>
+  </p:cSld>
+  <p:clrMapOvr>
+    <a:masterClrMapping/>
+  </p:clrMapOvr>
+  <p:timing>
+    <p:tnLst>
+      <p:par>
+        <p:cTn id="1" dur="indefinite" restart="never" nodeType="tmRoot"/>
+      </p:par>
+    </p:tnLst>
+  </p:timing>
+</p:sld>
+</file>
+
+<file path=ppt/slides/slide3.xml><?xml version="1.0" encoding="utf-8"?>
+<p:sld xmlns:a="http://schemas.openxmlformats.org/drawingml/2006/main" xmlns:r="http://schemas.openxmlformats.org/officeDocument/2006/relationships" xmlns:p="http://schemas.openxmlformats.org/presentationml/2006/main">
+  <p:cSld>
+    <p:spTree>
+      <p:nvGrpSpPr>
+        <p:cNvPr id="1" name=""/>
+        <p:cNvGrpSpPr/>
+        <p:nvPr/>
+      </p:nvGrpSpPr>
+      <p:grpSpPr>
+        <a:xfrm>
+          <a:off x="0" y="0"/>
+          <a:ext cx="0" cy="0"/>
+          <a:chOff x="0" y="0"/>
+          <a:chExt cx="0" cy="0"/>
+        </a:xfrm>
+      </p:grpSpPr>
+      <p:sp>
+        <p:nvSpPr>
+          <p:cNvPr id="2" name="Titel 1"/>
+          <p:cNvSpPr>
+            <a:spLocks noGrp="1"/>
+          </p:cNvSpPr>
+          <p:nvPr>
+            <p:ph type="title"/>
+          </p:nvPr>
+        </p:nvSpPr>
+        <p:spPr/>
+        <p:txBody>
+          <a:bodyPr/>
+          <a:lstStyle/>
+          <a:p>
+            <a:r>
+              <a:rPr lang="de-CH" dirty="0" smtClean="0"/>
               <a:t>Demo</a:t>
             </a:r>
             <a:endParaRPr lang="de-CH" dirty="0"/>
@@ -5728,257 +6842,6 @@
 </p:sld>
 </file>
 
-<file path=ppt/slides/slide3.xml><?xml version="1.0" encoding="utf-8"?>
-<p:sld xmlns:a="http://schemas.openxmlformats.org/drawingml/2006/main" xmlns:r="http://schemas.openxmlformats.org/officeDocument/2006/relationships" xmlns:p="http://schemas.openxmlformats.org/presentationml/2006/main">
-  <p:cSld>
-    <p:spTree>
-      <p:nvGrpSpPr>
-        <p:cNvPr id="1" name=""/>
-        <p:cNvGrpSpPr/>
-        <p:nvPr/>
-      </p:nvGrpSpPr>
-      <p:grpSpPr>
-        <a:xfrm>
-          <a:off x="0" y="0"/>
-          <a:ext cx="0" cy="0"/>
-          <a:chOff x="0" y="0"/>
-          <a:chExt cx="0" cy="0"/>
-        </a:xfrm>
-      </p:grpSpPr>
-      <p:sp>
-        <p:nvSpPr>
-          <p:cNvPr id="2" name="Titel 1"/>
-          <p:cNvSpPr>
-            <a:spLocks noGrp="1"/>
-          </p:cNvSpPr>
-          <p:nvPr>
-            <p:ph type="title"/>
-          </p:nvPr>
-        </p:nvSpPr>
-        <p:spPr/>
-        <p:txBody>
-          <a:bodyPr/>
-          <a:lstStyle/>
-          <a:p>
-            <a:r>
-              <a:rPr lang="de-CH" dirty="0" smtClean="0"/>
-              <a:t>Projekt OpenGL </a:t>
-            </a:r>
-            <a:r>
-              <a:rPr lang="de-CH" dirty="0" err="1" smtClean="0"/>
-              <a:t>Wavefront</a:t>
-            </a:r>
-            <a:r>
-              <a:rPr lang="de-CH" dirty="0" smtClean="0"/>
-              <a:t> Viewer</a:t>
-            </a:r>
-            <a:endParaRPr lang="de-CH" dirty="0"/>
-          </a:p>
-        </p:txBody>
-      </p:sp>
-      <p:sp>
-        <p:nvSpPr>
-          <p:cNvPr id="3" name="Inhaltsplatzhalter 2"/>
-          <p:cNvSpPr>
-            <a:spLocks noGrp="1"/>
-          </p:cNvSpPr>
-          <p:nvPr>
-            <p:ph idx="1"/>
-          </p:nvPr>
-        </p:nvSpPr>
-        <p:spPr/>
-        <p:txBody>
-          <a:bodyPr>
-            <a:noAutofit/>
-          </a:bodyPr>
-          <a:lstStyle/>
-          <a:p>
-            <a:pPr marL="0" indent="0">
-              <a:buNone/>
-            </a:pPr>
-            <a:r>
-              <a:rPr lang="de-CH" sz="1600" dirty="0" err="1"/>
-              <a:t>Wavefront</a:t>
-            </a:r>
-            <a:r>
-              <a:rPr lang="de-CH" sz="1600" dirty="0"/>
-              <a:t> </a:t>
-            </a:r>
-            <a:r>
-              <a:rPr lang="de-CH" sz="1600" dirty="0" err="1" smtClean="0"/>
-              <a:t>Obj</a:t>
-            </a:r>
-            <a:r>
-              <a:rPr lang="de-CH" sz="1600" dirty="0" smtClean="0"/>
-              <a:t> </a:t>
-            </a:r>
-          </a:p>
-          <a:p>
-            <a:pPr lvl="1"/>
-            <a:r>
-              <a:rPr lang="de-CH" sz="1600" dirty="0" smtClean="0"/>
-              <a:t>Datei einlesen</a:t>
-            </a:r>
-          </a:p>
-          <a:p>
-            <a:pPr marL="0" indent="0">
-              <a:buNone/>
-            </a:pPr>
-            <a:endParaRPr lang="de-CH" sz="1600" dirty="0" smtClean="0"/>
-          </a:p>
-          <a:p>
-            <a:pPr marL="0" indent="0">
-              <a:buNone/>
-            </a:pPr>
-            <a:r>
-              <a:rPr lang="de-CH" sz="1600" dirty="0" smtClean="0"/>
-              <a:t>Rendering</a:t>
-            </a:r>
-          </a:p>
-          <a:p>
-            <a:pPr lvl="1"/>
-            <a:r>
-              <a:rPr lang="de-CH" sz="1600" dirty="0" smtClean="0"/>
-              <a:t>3D Model gemäss </a:t>
-            </a:r>
-            <a:r>
-              <a:rPr lang="de-CH" sz="1600" dirty="0" err="1" smtClean="0"/>
-              <a:t>Obj</a:t>
-            </a:r>
-            <a:endParaRPr lang="de-CH" sz="1600" dirty="0" smtClean="0"/>
-          </a:p>
-          <a:p>
-            <a:pPr lvl="1"/>
-            <a:r>
-              <a:rPr lang="de-CH" sz="1600" dirty="0" smtClean="0"/>
-              <a:t>Gitternetz</a:t>
-            </a:r>
-          </a:p>
-          <a:p>
-            <a:pPr lvl="1"/>
-            <a:r>
-              <a:rPr lang="de-CH" sz="1600" dirty="0" smtClean="0"/>
-              <a:t>Sonne</a:t>
-            </a:r>
-          </a:p>
-          <a:p>
-            <a:pPr lvl="1"/>
-            <a:endParaRPr lang="de-CH" sz="1600" dirty="0" smtClean="0"/>
-          </a:p>
-          <a:p>
-            <a:pPr marL="0" indent="0">
-              <a:buNone/>
-            </a:pPr>
-            <a:r>
-              <a:rPr lang="de-CH" sz="1600" dirty="0" smtClean="0"/>
-              <a:t>Beleuchtung</a:t>
-            </a:r>
-            <a:endParaRPr lang="de-CH" sz="1600" dirty="0"/>
-          </a:p>
-          <a:p>
-            <a:pPr lvl="1"/>
-            <a:r>
-              <a:rPr lang="de-CH" sz="1600" dirty="0" smtClean="0"/>
-              <a:t>Statisches Punktlicht </a:t>
-            </a:r>
-          </a:p>
-          <a:p>
-            <a:pPr lvl="1"/>
-            <a:r>
-              <a:rPr lang="de-CH" sz="1600" dirty="0" err="1"/>
-              <a:t>Phong</a:t>
-            </a:r>
-            <a:r>
-              <a:rPr lang="de-CH" sz="1600" dirty="0"/>
-              <a:t> </a:t>
-            </a:r>
-            <a:r>
-              <a:rPr lang="de-CH" sz="1600" dirty="0" err="1"/>
-              <a:t>reflection</a:t>
-            </a:r>
-            <a:r>
-              <a:rPr lang="de-CH" sz="1600" dirty="0"/>
-              <a:t> </a:t>
-            </a:r>
-            <a:r>
-              <a:rPr lang="de-CH" sz="1600" dirty="0" err="1" smtClean="0"/>
-              <a:t>model</a:t>
-            </a:r>
-            <a:endParaRPr lang="de-CH" sz="1600" dirty="0" smtClean="0"/>
-          </a:p>
-          <a:p>
-            <a:pPr lvl="1"/>
-            <a:r>
-              <a:rPr lang="de-CH" sz="1600" dirty="0" smtClean="0"/>
-              <a:t>Ambientes, Diffuses, </a:t>
-            </a:r>
-            <a:r>
-              <a:rPr lang="de-CH" sz="1600" dirty="0" err="1" smtClean="0"/>
-              <a:t>Spekulares</a:t>
-            </a:r>
-            <a:r>
-              <a:rPr lang="de-CH" sz="1600" dirty="0" smtClean="0"/>
-              <a:t> Licht</a:t>
-            </a:r>
-          </a:p>
-          <a:p>
-            <a:pPr marL="0" indent="0">
-              <a:buNone/>
-            </a:pPr>
-            <a:endParaRPr lang="de-CH" sz="1600" dirty="0" smtClean="0"/>
-          </a:p>
-          <a:p>
-            <a:pPr marL="0" indent="0">
-              <a:buNone/>
-            </a:pPr>
-            <a:r>
-              <a:rPr lang="de-CH" sz="1600" dirty="0" smtClean="0"/>
-              <a:t>Matrizen</a:t>
-            </a:r>
-            <a:endParaRPr lang="de-CH" sz="1600" dirty="0"/>
-          </a:p>
-          <a:p>
-            <a:pPr lvl="1"/>
-            <a:r>
-              <a:rPr lang="de-CH" sz="1600" dirty="0" smtClean="0"/>
-              <a:t>Projektionsmatrix</a:t>
-            </a:r>
-            <a:endParaRPr lang="de-CH" sz="1600" dirty="0"/>
-          </a:p>
-          <a:p>
-            <a:pPr lvl="1"/>
-            <a:r>
-              <a:rPr lang="de-CH" sz="1600" dirty="0" smtClean="0"/>
-              <a:t>Transformationsmatrix</a:t>
-            </a:r>
-            <a:endParaRPr lang="de-CH" sz="1600" dirty="0"/>
-          </a:p>
-          <a:p>
-            <a:pPr lvl="1"/>
-            <a:endParaRPr lang="de-CH" sz="1600" dirty="0"/>
-          </a:p>
-        </p:txBody>
-      </p:sp>
-    </p:spTree>
-    <p:extLst>
-      <p:ext uri="{BB962C8B-B14F-4D97-AF65-F5344CB8AC3E}">
-        <p14:creationId xmlns:p14="http://schemas.microsoft.com/office/powerpoint/2010/main" val="2870412615"/>
-      </p:ext>
-    </p:extLst>
-  </p:cSld>
-  <p:clrMapOvr>
-    <a:masterClrMapping/>
-  </p:clrMapOvr>
-  <p:timing>
-    <p:tnLst>
-      <p:par>
-        <p:cTn id="1" dur="indefinite" restart="never" nodeType="tmRoot"/>
-      </p:par>
-    </p:tnLst>
-  </p:timing>
-</p:sld>
-</file>
-
 <file path=ppt/slides/slide4.xml><?xml version="1.0" encoding="utf-8"?>
 <p:sld xmlns:a="http://schemas.openxmlformats.org/drawingml/2006/main" xmlns:r="http://schemas.openxmlformats.org/officeDocument/2006/relationships" xmlns:p="http://schemas.openxmlformats.org/presentationml/2006/main">
   <p:cSld>
@@ -6043,8 +6906,9 @@
             </a:pPr>
             <a:r>
               <a:rPr lang="de-CH" sz="1800" dirty="0" smtClean="0"/>
-              <a:t>Entwicklungsumgebung</a:t>
-            </a:r>
+              <a:t>Entwicklungsumgebung:</a:t>
+            </a:r>
+            <a:endParaRPr lang="de-CH" sz="1800" dirty="0" smtClean="0"/>
           </a:p>
           <a:p>
             <a:pPr lvl="1"/>
@@ -6062,6 +6926,14 @@
             <a:r>
               <a:rPr lang="de-CH" sz="1800" dirty="0" err="1" smtClean="0"/>
               <a:t>GitHub</a:t>
+            </a:r>
+            <a:endParaRPr lang="de-CH" sz="1800" dirty="0" smtClean="0"/>
+          </a:p>
+          <a:p>
+            <a:pPr lvl="1"/>
+            <a:r>
+              <a:rPr lang="de-CH" sz="1800" dirty="0" err="1" smtClean="0"/>
+              <a:t>Maven</a:t>
             </a:r>
             <a:endParaRPr lang="de-CH" sz="1800" dirty="0" smtClean="0"/>
           </a:p>
@@ -6077,8 +6949,13 @@
             </a:pPr>
             <a:r>
               <a:rPr lang="de-CH" sz="1800" dirty="0" smtClean="0"/>
-              <a:t>3D Modellierung</a:t>
-            </a:r>
+              <a:t>3D </a:t>
+            </a:r>
+            <a:r>
+              <a:rPr lang="de-CH" sz="1800" dirty="0" smtClean="0"/>
+              <a:t>Modellierung:</a:t>
+            </a:r>
+            <a:endParaRPr lang="de-CH" sz="1800" dirty="0" smtClean="0"/>
           </a:p>
           <a:p>
             <a:pPr lvl="1"/>
@@ -6108,6 +6985,10 @@
             <a:r>
               <a:rPr lang="de-CH" sz="1800" dirty="0" err="1" smtClean="0"/>
               <a:t>Shading</a:t>
+            </a:r>
+            <a:r>
+              <a:rPr lang="de-CH" sz="1800" dirty="0" smtClean="0"/>
+              <a:t>:</a:t>
             </a:r>
             <a:endParaRPr lang="de-CH" sz="1600" dirty="0" smtClean="0"/>
           </a:p>
@@ -6265,11 +7146,11 @@
           <a:p>
             <a:r>
               <a:rPr lang="de-CH" sz="1800" dirty="0" smtClean="0"/>
-              <a:t>Position des Knotens </a:t>
+              <a:t>Position des Knotens (x, y, z</a:t>
             </a:r>
             <a:r>
               <a:rPr lang="de-CH" sz="1800" dirty="0" smtClean="0"/>
-              <a:t>(x, y, z)</a:t>
+              <a:t>):</a:t>
             </a:r>
             <a:endParaRPr lang="de-CH" sz="1800" dirty="0" smtClean="0"/>
           </a:p>
@@ -6303,7 +7184,11 @@
           <a:p>
             <a:r>
               <a:rPr lang="de-CH" sz="1800" dirty="0" smtClean="0"/>
-              <a:t>Normalen Vektor (x, y, z)</a:t>
+              <a:t>Normalen Vektor (x, y, z</a:t>
+            </a:r>
+            <a:r>
+              <a:rPr lang="de-CH" sz="1800" dirty="0" smtClean="0"/>
+              <a:t>):</a:t>
             </a:r>
             <a:endParaRPr lang="de-CH" sz="1800" dirty="0" smtClean="0"/>
           </a:p>
@@ -6372,7 +7257,11 @@
             </a:r>
             <a:r>
               <a:rPr lang="de-CH" sz="1800" dirty="0" smtClean="0"/>
-              <a:t> (Vertex/Normale/Textur)</a:t>
+              <a:t> (Vertex/Normale/Textur</a:t>
+            </a:r>
+            <a:r>
+              <a:rPr lang="de-CH" sz="1800" dirty="0" smtClean="0"/>
+              <a:t>):</a:t>
             </a:r>
             <a:endParaRPr lang="de-CH" sz="1800" dirty="0"/>
           </a:p>
@@ -6482,8 +7371,13 @@
           <a:p>
             <a:r>
               <a:rPr lang="de-CH" dirty="0" smtClean="0"/>
-              <a:t>2 Vertices im Speicher</a:t>
-            </a:r>
+              <a:t>2 Vertices im </a:t>
+            </a:r>
+            <a:r>
+              <a:rPr lang="de-CH" dirty="0" smtClean="0"/>
+              <a:t>Speicher:</a:t>
+            </a:r>
+            <a:endParaRPr lang="de-CH" dirty="0" smtClean="0"/>
           </a:p>
           <a:p>
             <a:pPr lvl="1"/>

</xml_diff>